<commit_message>
Updated day 4 notes.
</commit_message>
<xml_diff>
--- a/day4/notes_day4.pptx
+++ b/day4/notes_day4.pptx
@@ -264,7 +264,7 @@
           <a:p>
             <a:fld id="{462EB6DF-366F-4C23-BEE5-E23E7CB73D99}" type="datetimeFigureOut">
               <a:rPr lang="en-US" smtClean="0"/>
-              <a:t>9/17/2016</a:t>
+              <a:t>9/18/2016</a:t>
             </a:fld>
             <a:endParaRPr lang="en-US"/>
           </a:p>
@@ -434,7 +434,7 @@
           <a:p>
             <a:fld id="{462EB6DF-366F-4C23-BEE5-E23E7CB73D99}" type="datetimeFigureOut">
               <a:rPr lang="en-US" smtClean="0"/>
-              <a:t>9/17/2016</a:t>
+              <a:t>9/18/2016</a:t>
             </a:fld>
             <a:endParaRPr lang="en-US"/>
           </a:p>
@@ -614,7 +614,7 @@
           <a:p>
             <a:fld id="{462EB6DF-366F-4C23-BEE5-E23E7CB73D99}" type="datetimeFigureOut">
               <a:rPr lang="en-US" smtClean="0"/>
-              <a:t>9/17/2016</a:t>
+              <a:t>9/18/2016</a:t>
             </a:fld>
             <a:endParaRPr lang="en-US"/>
           </a:p>
@@ -784,7 +784,7 @@
           <a:p>
             <a:fld id="{462EB6DF-366F-4C23-BEE5-E23E7CB73D99}" type="datetimeFigureOut">
               <a:rPr lang="en-US" smtClean="0"/>
-              <a:t>9/17/2016</a:t>
+              <a:t>9/18/2016</a:t>
             </a:fld>
             <a:endParaRPr lang="en-US"/>
           </a:p>
@@ -1028,7 +1028,7 @@
           <a:p>
             <a:fld id="{462EB6DF-366F-4C23-BEE5-E23E7CB73D99}" type="datetimeFigureOut">
               <a:rPr lang="en-US" smtClean="0"/>
-              <a:t>9/17/2016</a:t>
+              <a:t>9/18/2016</a:t>
             </a:fld>
             <a:endParaRPr lang="en-US"/>
           </a:p>
@@ -1260,7 +1260,7 @@
           <a:p>
             <a:fld id="{462EB6DF-366F-4C23-BEE5-E23E7CB73D99}" type="datetimeFigureOut">
               <a:rPr lang="en-US" smtClean="0"/>
-              <a:t>9/17/2016</a:t>
+              <a:t>9/18/2016</a:t>
             </a:fld>
             <a:endParaRPr lang="en-US"/>
           </a:p>
@@ -1627,7 +1627,7 @@
           <a:p>
             <a:fld id="{462EB6DF-366F-4C23-BEE5-E23E7CB73D99}" type="datetimeFigureOut">
               <a:rPr lang="en-US" smtClean="0"/>
-              <a:t>9/17/2016</a:t>
+              <a:t>9/18/2016</a:t>
             </a:fld>
             <a:endParaRPr lang="en-US"/>
           </a:p>
@@ -1745,7 +1745,7 @@
           <a:p>
             <a:fld id="{462EB6DF-366F-4C23-BEE5-E23E7CB73D99}" type="datetimeFigureOut">
               <a:rPr lang="en-US" smtClean="0"/>
-              <a:t>9/17/2016</a:t>
+              <a:t>9/18/2016</a:t>
             </a:fld>
             <a:endParaRPr lang="en-US"/>
           </a:p>
@@ -1840,7 +1840,7 @@
           <a:p>
             <a:fld id="{462EB6DF-366F-4C23-BEE5-E23E7CB73D99}" type="datetimeFigureOut">
               <a:rPr lang="en-US" smtClean="0"/>
-              <a:t>9/17/2016</a:t>
+              <a:t>9/18/2016</a:t>
             </a:fld>
             <a:endParaRPr lang="en-US"/>
           </a:p>
@@ -2117,7 +2117,7 @@
           <a:p>
             <a:fld id="{462EB6DF-366F-4C23-BEE5-E23E7CB73D99}" type="datetimeFigureOut">
               <a:rPr lang="en-US" smtClean="0"/>
-              <a:t>9/17/2016</a:t>
+              <a:t>9/18/2016</a:t>
             </a:fld>
             <a:endParaRPr lang="en-US"/>
           </a:p>
@@ -2374,7 +2374,7 @@
           <a:p>
             <a:fld id="{462EB6DF-366F-4C23-BEE5-E23E7CB73D99}" type="datetimeFigureOut">
               <a:rPr lang="en-US" smtClean="0"/>
-              <a:t>9/17/2016</a:t>
+              <a:t>9/18/2016</a:t>
             </a:fld>
             <a:endParaRPr lang="en-US"/>
           </a:p>
@@ -2587,7 +2587,7 @@
           <a:p>
             <a:fld id="{462EB6DF-366F-4C23-BEE5-E23E7CB73D99}" type="datetimeFigureOut">
               <a:rPr lang="en-US" smtClean="0"/>
-              <a:t>9/17/2016</a:t>
+              <a:t>9/18/2016</a:t>
             </a:fld>
             <a:endParaRPr lang="en-US"/>
           </a:p>
@@ -3446,7 +3446,7 @@
             </a:r>
             <a:r>
               <a:rPr lang="en-US" dirty="0"/>
-              <a:t>and use it to edit code in many languages, in conjunctions with separate compilers, interpreters, etc.</a:t>
+              <a:t>and use it to edit code in many languages, in conjunction with separate compilers, interpreters, etc.</a:t>
             </a:r>
           </a:p>
         </p:txBody>
@@ -3976,7 +3976,7 @@
         <p:spPr/>
         <p:txBody>
           <a:bodyPr>
-            <a:normAutofit fontScale="85000" lnSpcReduction="20000"/>
+            <a:normAutofit lnSpcReduction="10000"/>
           </a:bodyPr>
           <a:lstStyle/>
           <a:p>
@@ -3988,15 +3988,28 @@
             </a:pPr>
             <a:r>
               <a:rPr lang="en-US" dirty="0"/>
-              <a:t>VBA is a condescending, </a:t>
-            </a:r>
-            <a:r>
-              <a:rPr lang="en-US" dirty="0" err="1"/>
-              <a:t>underdesigned</a:t>
-            </a:r>
-            <a:r>
-              <a:rPr lang="en-US" dirty="0"/>
-              <a:t>, overcomplicated dumpster fire of a language, designed by people who thought themselves smarter than they were, for people they thought much dumber than themselves, not merely without aesthetic sense but rather with the sort of anti-taste required to infallibly and invariably choose the worst possible option at each design decision.</a:t>
+              <a:t>VBA is a condescending, under-designed, overcomplicated dumpster fire of a language…</a:t>
+            </a:r>
+          </a:p>
+          <a:p>
+            <a:pPr marL="0" indent="0">
+              <a:lnSpc>
+                <a:spcPct val="110000"/>
+              </a:lnSpc>
+              <a:buNone/>
+            </a:pPr>
+            <a:endParaRPr lang="en-US" dirty="0"/>
+          </a:p>
+          <a:p>
+            <a:pPr marL="0" indent="0">
+              <a:lnSpc>
+                <a:spcPct val="110000"/>
+              </a:lnSpc>
+              <a:buNone/>
+            </a:pPr>
+            <a:r>
+              <a:rPr lang="en-US" dirty="0"/>
+              <a:t>(… I had more here.)</a:t>
             </a:r>
           </a:p>
           <a:p>

</xml_diff>